<commit_message>
adding repo link to the presentation
</commit_message>
<xml_diff>
--- a/santiago_madariaga_backstepping.pptx
+++ b/santiago_madariaga_backstepping.pptx
@@ -11718,7 +11718,7 @@
         <p:spPr>
           <a:xfrm>
             <a:off x="19193934" y="19176127"/>
-            <a:ext cx="10391565" cy="1946658"/>
+            <a:ext cx="10391565" cy="1347189"/>
           </a:xfrm>
           <a:prstGeom prst="rect">
             <a:avLst/>
@@ -11746,7 +11746,7 @@
               <a:buAutoNum type="arabicPeriod"/>
             </a:pPr>
             <a:r>
-              <a:rPr lang="es-PE" sz="1600" dirty="0">
+              <a:rPr lang="es-PE" sz="1600">
                 <a:solidFill>
                   <a:schemeClr val="dk1"/>
                 </a:solidFill>
@@ -11767,7 +11767,7 @@
               <a:buAutoNum type="arabicPeriod"/>
             </a:pPr>
             <a:r>
-              <a:rPr lang="es-PE" sz="1600" dirty="0">
+              <a:rPr lang="es-PE" sz="1600">
                 <a:solidFill>
                   <a:schemeClr val="dk1"/>
                 </a:solidFill>
@@ -11778,6 +11778,15 @@
               </a:rPr>
               <a:t>A. Rojas, “Control No Lineal Multivariable, Aplicaciones en Tiempo Real”, Editorial: UNI, 2012, ISB: 978-612-4072-18-5. </a:t>
             </a:r>
+            <a:endParaRPr lang="es-PE" sz="1600" dirty="0">
+              <a:solidFill>
+                <a:schemeClr val="dk1"/>
+              </a:solidFill>
+              <a:latin typeface="Calibri"/>
+              <a:ea typeface="Calibri"/>
+              <a:cs typeface="Calibri"/>
+              <a:sym typeface="Calibri"/>
+            </a:endParaRPr>
           </a:p>
         </p:txBody>
       </p:sp>
@@ -12522,7 +12531,7 @@
         <p:spPr>
           <a:xfrm>
             <a:off x="156426" y="2906938"/>
-            <a:ext cx="8713335" cy="967457"/>
+            <a:ext cx="8673781" cy="967457"/>
           </a:xfrm>
           <a:prstGeom prst="roundRect">
             <a:avLst>
@@ -12580,7 +12589,7 @@
           </a:xfrm>
           <a:prstGeom prst="roundRect">
             <a:avLst>
-              <a:gd name="adj" fmla="val 9095"/>
+              <a:gd name="adj" fmla="val 14040"/>
             </a:avLst>
           </a:prstGeom>
           <a:noFill/>
@@ -12634,7 +12643,7 @@
           </a:xfrm>
           <a:prstGeom prst="roundRect">
             <a:avLst>
-              <a:gd name="adj" fmla="val 5141"/>
+              <a:gd name="adj" fmla="val 8352"/>
             </a:avLst>
           </a:prstGeom>
           <a:noFill/>
@@ -12688,7 +12697,7 @@
           </a:xfrm>
           <a:prstGeom prst="roundRect">
             <a:avLst>
-              <a:gd name="adj" fmla="val 1361"/>
+              <a:gd name="adj" fmla="val 4000"/>
             </a:avLst>
           </a:prstGeom>
           <a:noFill/>
@@ -12742,7 +12751,7 @@
           </a:xfrm>
           <a:prstGeom prst="roundRect">
             <a:avLst>
-              <a:gd name="adj" fmla="val 6507"/>
+              <a:gd name="adj" fmla="val 4529"/>
             </a:avLst>
           </a:prstGeom>
           <a:noFill/>
@@ -12796,7 +12805,7 @@
           </a:xfrm>
           <a:prstGeom prst="roundRect">
             <a:avLst>
-              <a:gd name="adj" fmla="val 3052"/>
+              <a:gd name="adj" fmla="val 4604"/>
             </a:avLst>
           </a:prstGeom>
           <a:noFill/>
@@ -12845,7 +12854,7 @@
         </p:nvSpPr>
         <p:spPr>
           <a:xfrm>
-            <a:off x="19033676" y="2906938"/>
+            <a:off x="19033676" y="2842940"/>
             <a:ext cx="10981483" cy="4864399"/>
           </a:xfrm>
           <a:prstGeom prst="roundRect">
@@ -12904,7 +12913,7 @@
           </a:xfrm>
           <a:prstGeom prst="roundRect">
             <a:avLst>
-              <a:gd name="adj" fmla="val 6507"/>
+              <a:gd name="adj" fmla="val 4959"/>
             </a:avLst>
           </a:prstGeom>
           <a:noFill/>
@@ -12958,7 +12967,7 @@
           </a:xfrm>
           <a:prstGeom prst="roundRect">
             <a:avLst>
-              <a:gd name="adj" fmla="val 25329"/>
+              <a:gd name="adj" fmla="val 19055"/>
             </a:avLst>
           </a:prstGeom>
           <a:noFill/>
@@ -13012,7 +13021,7 @@
           </a:xfrm>
           <a:prstGeom prst="roundRect">
             <a:avLst>
-              <a:gd name="adj" fmla="val 4780"/>
+              <a:gd name="adj" fmla="val 13913"/>
             </a:avLst>
           </a:prstGeom>
           <a:noFill/>
@@ -22412,6 +22421,41 @@
             <a:r>
               <a:rPr lang="es-PE" dirty="0"/>
               <a:t>Figura 5. Señales delas salidas y las referencias en seguimiento</a:t>
+            </a:r>
+          </a:p>
+        </p:txBody>
+      </p:sp>
+      <p:sp>
+        <p:nvSpPr>
+          <p:cNvPr id="110" name="CuadroTexto 109">
+            <a:extLst>
+              <a:ext uri="{FF2B5EF4-FFF2-40B4-BE49-F238E27FC236}">
+                <a16:creationId xmlns:a16="http://schemas.microsoft.com/office/drawing/2014/main" id="{B609AF82-E098-23A9-6856-A202C19EBD86}"/>
+              </a:ext>
+            </a:extLst>
+          </p:cNvPr>
+          <p:cNvSpPr txBox="1"/>
+          <p:nvPr/>
+        </p:nvSpPr>
+        <p:spPr>
+          <a:xfrm>
+            <a:off x="27210064" y="21107057"/>
+            <a:ext cx="3989172" cy="261610"/>
+          </a:xfrm>
+          <a:prstGeom prst="rect">
+            <a:avLst/>
+          </a:prstGeom>
+          <a:noFill/>
+        </p:spPr>
+        <p:txBody>
+          <a:bodyPr wrap="square">
+            <a:spAutoFit/>
+          </a:bodyPr>
+          <a:lstStyle/>
+          <a:p>
+            <a:r>
+              <a:rPr lang="es-PE" sz="1100" dirty="0"/>
+              <a:t>https://github.com/loaspra/2022-1-ECE-project</a:t>
             </a:r>
           </a:p>
         </p:txBody>

</xml_diff>